<commit_message>
Last modif for Dashboard V04
</commit_message>
<xml_diff>
--- a/Nouveau dossier/Présentation1.pptx
+++ b/Nouveau dossier/Présentation1.pptx
@@ -117,18 +117,18 @@
   <pc:docChgLst>
     <pc:chgData name="Ahmed CHAH" userId="2c5abe8b-f134-4489-8704-255050b542c5" providerId="ADAL" clId="{7BC109B6-55C7-43A0-9C1A-91C52D63221F}"/>
     <pc:docChg chg="modSld">
-      <pc:chgData name="Ahmed CHAH" userId="2c5abe8b-f134-4489-8704-255050b542c5" providerId="ADAL" clId="{7BC109B6-55C7-43A0-9C1A-91C52D63221F}" dt="2025-04-14T07:44:12.708" v="5" actId="13926"/>
+      <pc:chgData name="Ahmed CHAH" userId="2c5abe8b-f134-4489-8704-255050b542c5" providerId="ADAL" clId="{7BC109B6-55C7-43A0-9C1A-91C52D63221F}" dt="2025-04-14T14:14:40.310" v="6" actId="13926"/>
       <pc:docMkLst>
         <pc:docMk/>
       </pc:docMkLst>
       <pc:sldChg chg="modSp mod">
-        <pc:chgData name="Ahmed CHAH" userId="2c5abe8b-f134-4489-8704-255050b542c5" providerId="ADAL" clId="{7BC109B6-55C7-43A0-9C1A-91C52D63221F}" dt="2025-04-14T07:44:12.708" v="5" actId="13926"/>
+        <pc:chgData name="Ahmed CHAH" userId="2c5abe8b-f134-4489-8704-255050b542c5" providerId="ADAL" clId="{7BC109B6-55C7-43A0-9C1A-91C52D63221F}" dt="2025-04-14T14:14:40.310" v="6" actId="13926"/>
         <pc:sldMkLst>
           <pc:docMk/>
           <pc:sldMk cId="3493046402" sldId="256"/>
         </pc:sldMkLst>
         <pc:spChg chg="mod">
-          <ac:chgData name="Ahmed CHAH" userId="2c5abe8b-f134-4489-8704-255050b542c5" providerId="ADAL" clId="{7BC109B6-55C7-43A0-9C1A-91C52D63221F}" dt="2025-04-14T07:44:12.708" v="5" actId="13926"/>
+          <ac:chgData name="Ahmed CHAH" userId="2c5abe8b-f134-4489-8704-255050b542c5" providerId="ADAL" clId="{7BC109B6-55C7-43A0-9C1A-91C52D63221F}" dt="2025-04-14T14:14:40.310" v="6" actId="13926"/>
           <ac:spMkLst>
             <pc:docMk/>
             <pc:sldMk cId="3493046402" sldId="256"/>
@@ -3983,7 +3983,11 @@
               <a:buAutoNum type="arabicPeriod"/>
             </a:pPr>
             <a:r>
-              <a:rPr lang="en-US" noProof="0" dirty="0"/>
+              <a:rPr lang="en-US" noProof="0" dirty="0">
+                <a:highlight>
+                  <a:srgbClr val="FFFF00"/>
+                </a:highlight>
+              </a:rPr>
               <a:t>Compare 2 or all microrobot using best and bad case</a:t>
             </a:r>
           </a:p>
@@ -4356,6 +4360,81 @@
 </file>
 
 <file path=customXml/item1.xml><?xml version="1.0" encoding="utf-8"?>
+<p:properties xmlns:p="http://schemas.microsoft.com/office/2006/metadata/properties" xmlns:xsi="http://www.w3.org/2001/XMLSchema-instance" xmlns:pc="http://schemas.microsoft.com/office/infopath/2007/PartnerControls">
+  <documentManagement>
+    <TaxCatchAll xmlns="79361c6c-fea3-4edf-b4fa-5821e39e9bfe" xsi:nil="true"/>
+    <lcf76f155ced4ddcb4097134ff3c332f xmlns="7f867db0-d780-48fe-a112-754d1799c19e">
+      <Terms xmlns="http://schemas.microsoft.com/office/infopath/2007/PartnerControls"/>
+    </lcf76f155ced4ddcb4097134ff3c332f>
+    <_dlc_DocId xmlns="79361c6c-fea3-4edf-b4fa-5821e39e9bfe">N4XJ6CXEYHH6-631025465-499519</_dlc_DocId>
+    <_dlc_DocIdUrl xmlns="79361c6c-fea3-4edf-b4fa-5821e39e9bfe">
+      <Url>https://artedrone.sharepoint.com/sites/SharepointArtedrone/_layouts/15/DocIdRedir.aspx?ID=N4XJ6CXEYHH6-631025465-499519</Url>
+      <Description>N4XJ6CXEYHH6-631025465-499519</Description>
+    </_dlc_DocIdUrl>
+  </documentManagement>
+</p:properties>
+</file>
+
+<file path=customXml/item2.xml><?xml version="1.0" encoding="utf-8"?>
+<?mso-contentType ?>
+<spe:Receivers xmlns:spe="http://schemas.microsoft.com/sharepoint/events">
+  <Receiver>
+    <Name>Document ID Generator</Name>
+    <Synchronization>Synchronous</Synchronization>
+    <Type>10001</Type>
+    <SequenceNumber>1000</SequenceNumber>
+    <Url/>
+    <Assembly>Microsoft.Office.DocumentManagement, Version=16.0.0.0, Culture=neutral, PublicKeyToken=71e9bce111e9429c</Assembly>
+    <Class>Microsoft.Office.DocumentManagement.Internal.DocIdHandler</Class>
+    <Data/>
+    <Filter/>
+  </Receiver>
+  <Receiver>
+    <Name>Document ID Generator</Name>
+    <Synchronization>Synchronous</Synchronization>
+    <Type>10002</Type>
+    <SequenceNumber>1001</SequenceNumber>
+    <Url/>
+    <Assembly>Microsoft.Office.DocumentManagement, Version=16.0.0.0, Culture=neutral, PublicKeyToken=71e9bce111e9429c</Assembly>
+    <Class>Microsoft.Office.DocumentManagement.Internal.DocIdHandler</Class>
+    <Data/>
+    <Filter/>
+  </Receiver>
+  <Receiver>
+    <Name>Document ID Generator</Name>
+    <Synchronization>Synchronous</Synchronization>
+    <Type>10004</Type>
+    <SequenceNumber>1002</SequenceNumber>
+    <Url/>
+    <Assembly>Microsoft.Office.DocumentManagement, Version=16.0.0.0, Culture=neutral, PublicKeyToken=71e9bce111e9429c</Assembly>
+    <Class>Microsoft.Office.DocumentManagement.Internal.DocIdHandler</Class>
+    <Data/>
+    <Filter/>
+  </Receiver>
+  <Receiver>
+    <Name>Document ID Generator</Name>
+    <Synchronization>Synchronous</Synchronization>
+    <Type>10006</Type>
+    <SequenceNumber>1003</SequenceNumber>
+    <Url/>
+    <Assembly>Microsoft.Office.DocumentManagement, Version=16.0.0.0, Culture=neutral, PublicKeyToken=71e9bce111e9429c</Assembly>
+    <Class>Microsoft.Office.DocumentManagement.Internal.DocIdHandler</Class>
+    <Data/>
+    <Filter/>
+  </Receiver>
+</spe:Receivers>
+</file>
+
+<file path=customXml/item3.xml><?xml version="1.0" encoding="utf-8"?>
+<?mso-contentType ?>
+<FormTemplates xmlns="http://schemas.microsoft.com/sharepoint/v3/contenttype/forms">
+  <Display>DocumentLibraryForm</Display>
+  <Edit>DocumentLibraryForm</Edit>
+  <New>DocumentLibraryForm</New>
+</FormTemplates>
+</file>
+
+<file path=customXml/item4.xml><?xml version="1.0" encoding="utf-8"?>
 <ct:contentTypeSchema xmlns:ct="http://schemas.microsoft.com/office/2006/metadata/contentType" xmlns:ma="http://schemas.microsoft.com/office/2006/metadata/properties/metaAttributes" ct:_="" ma:_="" ma:contentTypeName="Document" ma:contentTypeID="0x0101005980ED226863A74FA2F9CA9139548579" ma:contentTypeVersion="16" ma:contentTypeDescription="Crée un document." ma:contentTypeScope="" ma:versionID="0242ed82f3266fd060e887ae3e26cb2b">
   <xsd:schema xmlns:xsd="http://www.w3.org/2001/XMLSchema" xmlns:xs="http://www.w3.org/2001/XMLSchema" xmlns:p="http://schemas.microsoft.com/office/2006/metadata/properties" xmlns:ns2="79361c6c-fea3-4edf-b4fa-5821e39e9bfe" xmlns:ns3="7f867db0-d780-48fe-a112-754d1799c19e" targetNamespace="http://schemas.microsoft.com/office/2006/metadata/properties" ma:root="true" ma:fieldsID="22c66529a84d53b789930f0e5aa4c2cf" ns2:_="" ns3:_="">
     <xsd:import namespace="79361c6c-fea3-4edf-b4fa-5821e39e9bfe"/>
@@ -4621,82 +4700,34 @@
 </ct:contentTypeSchema>
 </file>
 
-<file path=customXml/item2.xml><?xml version="1.0" encoding="utf-8"?>
-<?mso-contentType ?>
-<FormTemplates xmlns="http://schemas.microsoft.com/sharepoint/v3/contenttype/forms">
-  <Display>DocumentLibraryForm</Display>
-  <Edit>DocumentLibraryForm</Edit>
-  <New>DocumentLibraryForm</New>
-</FormTemplates>
+<file path=customXml/itemProps1.xml><?xml version="1.0" encoding="utf-8"?>
+<ds:datastoreItem xmlns:ds="http://schemas.openxmlformats.org/officeDocument/2006/customXml" ds:itemID="{559ECBD7-11E4-43D9-814D-66459C7F2A75}">
+  <ds:schemaRefs>
+    <ds:schemaRef ds:uri="http://schemas.microsoft.com/office/2006/metadata/properties"/>
+    <ds:schemaRef ds:uri="http://schemas.microsoft.com/office/infopath/2007/PartnerControls"/>
+    <ds:schemaRef ds:uri="79361c6c-fea3-4edf-b4fa-5821e39e9bfe"/>
+    <ds:schemaRef ds:uri="7f867db0-d780-48fe-a112-754d1799c19e"/>
+  </ds:schemaRefs>
+</ds:datastoreItem>
 </file>
 
-<file path=customXml/item3.xml><?xml version="1.0" encoding="utf-8"?>
-<?mso-contentType ?>
-<spe:Receivers xmlns:spe="http://schemas.microsoft.com/sharepoint/events">
-  <Receiver>
-    <Name>Document ID Generator</Name>
-    <Synchronization>Synchronous</Synchronization>
-    <Type>10001</Type>
-    <SequenceNumber>1000</SequenceNumber>
-    <Url/>
-    <Assembly>Microsoft.Office.DocumentManagement, Version=16.0.0.0, Culture=neutral, PublicKeyToken=71e9bce111e9429c</Assembly>
-    <Class>Microsoft.Office.DocumentManagement.Internal.DocIdHandler</Class>
-    <Data/>
-    <Filter/>
-  </Receiver>
-  <Receiver>
-    <Name>Document ID Generator</Name>
-    <Synchronization>Synchronous</Synchronization>
-    <Type>10002</Type>
-    <SequenceNumber>1001</SequenceNumber>
-    <Url/>
-    <Assembly>Microsoft.Office.DocumentManagement, Version=16.0.0.0, Culture=neutral, PublicKeyToken=71e9bce111e9429c</Assembly>
-    <Class>Microsoft.Office.DocumentManagement.Internal.DocIdHandler</Class>
-    <Data/>
-    <Filter/>
-  </Receiver>
-  <Receiver>
-    <Name>Document ID Generator</Name>
-    <Synchronization>Synchronous</Synchronization>
-    <Type>10004</Type>
-    <SequenceNumber>1002</SequenceNumber>
-    <Url/>
-    <Assembly>Microsoft.Office.DocumentManagement, Version=16.0.0.0, Culture=neutral, PublicKeyToken=71e9bce111e9429c</Assembly>
-    <Class>Microsoft.Office.DocumentManagement.Internal.DocIdHandler</Class>
-    <Data/>
-    <Filter/>
-  </Receiver>
-  <Receiver>
-    <Name>Document ID Generator</Name>
-    <Synchronization>Synchronous</Synchronization>
-    <Type>10006</Type>
-    <SequenceNumber>1003</SequenceNumber>
-    <Url/>
-    <Assembly>Microsoft.Office.DocumentManagement, Version=16.0.0.0, Culture=neutral, PublicKeyToken=71e9bce111e9429c</Assembly>
-    <Class>Microsoft.Office.DocumentManagement.Internal.DocIdHandler</Class>
-    <Data/>
-    <Filter/>
-  </Receiver>
-</spe:Receivers>
+<file path=customXml/itemProps2.xml><?xml version="1.0" encoding="utf-8"?>
+<ds:datastoreItem xmlns:ds="http://schemas.openxmlformats.org/officeDocument/2006/customXml" ds:itemID="{C81C161F-59FF-4C5D-A92C-1A0FA5CF10B3}">
+  <ds:schemaRefs>
+    <ds:schemaRef ds:uri="http://schemas.microsoft.com/sharepoint/events"/>
+  </ds:schemaRefs>
+</ds:datastoreItem>
 </file>
 
-<file path=customXml/item4.xml><?xml version="1.0" encoding="utf-8"?>
-<p:properties xmlns:p="http://schemas.microsoft.com/office/2006/metadata/properties" xmlns:xsi="http://www.w3.org/2001/XMLSchema-instance" xmlns:pc="http://schemas.microsoft.com/office/infopath/2007/PartnerControls">
-  <documentManagement>
-    <TaxCatchAll xmlns="79361c6c-fea3-4edf-b4fa-5821e39e9bfe" xsi:nil="true"/>
-    <lcf76f155ced4ddcb4097134ff3c332f xmlns="7f867db0-d780-48fe-a112-754d1799c19e">
-      <Terms xmlns="http://schemas.microsoft.com/office/infopath/2007/PartnerControls"/>
-    </lcf76f155ced4ddcb4097134ff3c332f>
-    <_dlc_DocId xmlns="79361c6c-fea3-4edf-b4fa-5821e39e9bfe">N4XJ6CXEYHH6-631025465-499519</_dlc_DocId>
-    <_dlc_DocIdUrl xmlns="79361c6c-fea3-4edf-b4fa-5821e39e9bfe">
-      <Url>https://artedrone.sharepoint.com/sites/SharepointArtedrone/_layouts/15/DocIdRedir.aspx?ID=N4XJ6CXEYHH6-631025465-499519</Url>
-      <Description>N4XJ6CXEYHH6-631025465-499519</Description>
-    </_dlc_DocIdUrl>
-  </documentManagement>
-</p:properties>
+<file path=customXml/itemProps3.xml><?xml version="1.0" encoding="utf-8"?>
+<ds:datastoreItem xmlns:ds="http://schemas.openxmlformats.org/officeDocument/2006/customXml" ds:itemID="{05DD2292-8CAB-4ECE-81AF-53C070129AC7}">
+  <ds:schemaRefs>
+    <ds:schemaRef ds:uri="http://schemas.microsoft.com/sharepoint/v3/contenttype/forms"/>
+  </ds:schemaRefs>
+</ds:datastoreItem>
 </file>
 
-<file path=customXml/itemProps1.xml><?xml version="1.0" encoding="utf-8"?>
+<file path=customXml/itemProps4.xml><?xml version="1.0" encoding="utf-8"?>
 <ds:datastoreItem xmlns:ds="http://schemas.openxmlformats.org/officeDocument/2006/customXml" ds:itemID="{02F5E0F1-FCAA-43FC-8265-C60E7A483ED7}">
   <ds:schemaRefs>
     <ds:schemaRef ds:uri="http://schemas.microsoft.com/office/2006/metadata/contentType"/>
@@ -4713,31 +4744,4 @@
     <ds:schemaRef ds:uri="http://schemas.microsoft.com/internal/obd"/>
   </ds:schemaRefs>
 </ds:datastoreItem>
-</file>
-
-<file path=customXml/itemProps2.xml><?xml version="1.0" encoding="utf-8"?>
-<ds:datastoreItem xmlns:ds="http://schemas.openxmlformats.org/officeDocument/2006/customXml" ds:itemID="{05DD2292-8CAB-4ECE-81AF-53C070129AC7}">
-  <ds:schemaRefs>
-    <ds:schemaRef ds:uri="http://schemas.microsoft.com/sharepoint/v3/contenttype/forms"/>
-  </ds:schemaRefs>
-</ds:datastoreItem>
-</file>
-
-<file path=customXml/itemProps3.xml><?xml version="1.0" encoding="utf-8"?>
-<ds:datastoreItem xmlns:ds="http://schemas.openxmlformats.org/officeDocument/2006/customXml" ds:itemID="{C81C161F-59FF-4C5D-A92C-1A0FA5CF10B3}">
-  <ds:schemaRefs>
-    <ds:schemaRef ds:uri="http://schemas.microsoft.com/sharepoint/events"/>
-  </ds:schemaRefs>
-</ds:datastoreItem>
-</file>
-
-<file path=customXml/itemProps4.xml><?xml version="1.0" encoding="utf-8"?>
-<ds:datastoreItem xmlns:ds="http://schemas.openxmlformats.org/officeDocument/2006/customXml" ds:itemID="{559ECBD7-11E4-43D9-814D-66459C7F2A75}">
-  <ds:schemaRefs>
-    <ds:schemaRef ds:uri="http://schemas.microsoft.com/office/2006/metadata/properties"/>
-    <ds:schemaRef ds:uri="http://schemas.microsoft.com/office/infopath/2007/PartnerControls"/>
-    <ds:schemaRef ds:uri="79361c6c-fea3-4edf-b4fa-5821e39e9bfe"/>
-    <ds:schemaRef ds:uri="7f867db0-d780-48fe-a112-754d1799c19e"/>
-  </ds:schemaRefs>
-</ds:datastoreItem>
 </file>
</xml_diff>